<commit_message>
Updated Lab 6 and Lab 7
</commit_message>
<xml_diff>
--- a/PowerBIQuickStart.E02/Power BI Quick Start2.E02.pptx
+++ b/PowerBIQuickStart.E02/Power BI Quick Start2.E02.pptx
@@ -395,7 +395,7 @@
           <a:p>
             <a:fld id="{7F5E9BF7-95E4-A242-BA1D-05FDCF603BE6}" type="datetime1">
               <a:rPr lang="en-US" smtClean="0"/>
-              <a:t>2/12/2021</a:t>
+              <a:t>3/1/2021</a:t>
             </a:fld>
             <a:endParaRPr lang="en-US"/>
           </a:p>
@@ -561,7 +561,7 @@
           <a:p>
             <a:fld id="{165DBCB1-0306-AD41-9452-11E7C08D5C04}" type="datetime1">
               <a:rPr lang="en-US" smtClean="0"/>
-              <a:t>2/12/2021</a:t>
+              <a:t>3/1/2021</a:t>
             </a:fld>
             <a:endParaRPr lang="en-US"/>
           </a:p>
@@ -20750,7 +20750,7 @@
           </a:ln>
           <a:extLst>
             <a:ext uri="{C572A759-6A51-4108-AA02-DFA0A04FC94B}">
-              <ma14:wrappingTextBoxFlag xmlns:ma14="http://schemas.microsoft.com/office/mac/drawingml/2011/main" xmlns="" val="1"/>
+              <ma14:wrappingTextBoxFlag xmlns="" xmlns:ma14="http://schemas.microsoft.com/office/mac/drawingml/2011/main" val="1"/>
             </a:ext>
           </a:extLst>
         </p:spPr>
@@ -25910,14 +25910,24 @@
                 <a:effectLst/>
                 <a:latin typeface="+mn-lt"/>
               </a:rPr>
-              <a:t>Power BI Quick Start #2 </a:t>
-            </a:r>
-            <a:r>
-              <a:rPr lang="en-US" dirty="0">
+              <a:t>Power BI Quick Start #</a:t>
+            </a:r>
+            <a:r>
+              <a:rPr lang="en-US" i="0">
+                <a:effectLst/>
                 <a:latin typeface="+mn-lt"/>
               </a:rPr>
-              <a:t>E01</a:t>
-            </a:r>
+              <a:t>2 </a:t>
+            </a:r>
+            <a:r>
+              <a:rPr lang="en-US">
+                <a:latin typeface="+mn-lt"/>
+              </a:rPr>
+              <a:t>E02</a:t>
+            </a:r>
+            <a:endParaRPr lang="en-US" dirty="0">
+              <a:latin typeface="+mn-lt"/>
+            </a:endParaRPr>
           </a:p>
         </p:txBody>
       </p:sp>
@@ -30591,18 +30601,18 @@
 </file>
 
 <file path=customXml/item1.xml><?xml version="1.0" encoding="utf-8"?>
+<p:properties xmlns:p="http://schemas.microsoft.com/office/2006/metadata/properties" xmlns:xsi="http://www.w3.org/2001/XMLSchema-instance" xmlns:pc="http://schemas.microsoft.com/office/infopath/2007/PartnerControls">
+  <documentManagement/>
+</p:properties>
+</file>
+
+<file path=customXml/item2.xml><?xml version="1.0" encoding="utf-8"?>
 <?mso-contentType ?>
 <FormTemplates xmlns="http://schemas.microsoft.com/sharepoint/v3/contenttype/forms">
   <Display>DocumentLibraryForm</Display>
   <Edit>DocumentLibraryForm</Edit>
   <New>DocumentLibraryForm</New>
 </FormTemplates>
-</file>
-
-<file path=customXml/item2.xml><?xml version="1.0" encoding="utf-8"?>
-<p:properties xmlns:p="http://schemas.microsoft.com/office/2006/metadata/properties" xmlns:xsi="http://www.w3.org/2001/XMLSchema-instance" xmlns:pc="http://schemas.microsoft.com/office/infopath/2007/PartnerControls">
-  <documentManagement/>
-</p:properties>
 </file>
 
 <file path=customXml/item3.xml><?xml version="1.0" encoding="utf-8"?>
@@ -30771,14 +30781,6 @@
 </file>
 
 <file path=customXml/itemProps1.xml><?xml version="1.0" encoding="utf-8"?>
-<ds:datastoreItem xmlns:ds="http://schemas.openxmlformats.org/officeDocument/2006/customXml" ds:itemID="{14883F0F-DE57-4ECA-B9BB-F22E8C5B5D82}">
-  <ds:schemaRefs>
-    <ds:schemaRef ds:uri="http://schemas.microsoft.com/sharepoint/v3/contenttype/forms"/>
-  </ds:schemaRefs>
-</ds:datastoreItem>
-</file>
-
-<file path=customXml/itemProps2.xml><?xml version="1.0" encoding="utf-8"?>
 <ds:datastoreItem xmlns:ds="http://schemas.openxmlformats.org/officeDocument/2006/customXml" ds:itemID="{D5E3C081-4081-47AD-A9A6-9F18F525DA1D}">
   <ds:schemaRefs>
     <ds:schemaRef ds:uri="http://purl.org/dc/terms/"/>
@@ -30791,6 +30793,14 @@
     <ds:schemaRef ds:uri="http://schemas.openxmlformats.org/package/2006/metadata/core-properties"/>
     <ds:schemaRef ds:uri="c8fb4810-c3cf-44db-bdf0-77d94482a97a"/>
     <ds:schemaRef ds:uri="http://schemas.microsoft.com/office/2006/metadata/properties"/>
+  </ds:schemaRefs>
+</ds:datastoreItem>
+</file>
+
+<file path=customXml/itemProps2.xml><?xml version="1.0" encoding="utf-8"?>
+<ds:datastoreItem xmlns:ds="http://schemas.openxmlformats.org/officeDocument/2006/customXml" ds:itemID="{14883F0F-DE57-4ECA-B9BB-F22E8C5B5D82}">
+  <ds:schemaRefs>
+    <ds:schemaRef ds:uri="http://schemas.microsoft.com/sharepoint/v3/contenttype/forms"/>
   </ds:schemaRefs>
 </ds:datastoreItem>
 </file>

</xml_diff>